<commit_message>
Slight spelling correction to ppt presentation
Slide 18 was updated to correct a spelling error (DataMean to
DataMeans).
</commit_message>
<xml_diff>
--- a/se_process/milestone3/milestone3.pptx
+++ b/se_process/milestone3/milestone3.pptx
@@ -227,7 +227,7 @@
           <a:p>
             <a:fld id="{B97E48AD-3BAE-BE47-BEAC-B0973A2754C5}" type="datetimeFigureOut">
               <a:rPr lang="en-US" smtClean="0"/>
-              <a:t>11/8/12</a:t>
+              <a:t>11/9/2012</a:t>
             </a:fld>
             <a:endParaRPr lang="en-US"/>
           </a:p>
@@ -676,7 +676,7 @@
           <a:p>
             <a:fld id="{1C2FB352-3FF1-4E47-B432-380F887EB6CA}" type="datetimeFigureOut">
               <a:rPr lang="en-US" smtClean="0"/>
-              <a:t>11/8/12</a:t>
+              <a:t>11/9/2012</a:t>
             </a:fld>
             <a:endParaRPr lang="en-US"/>
           </a:p>
@@ -846,7 +846,7 @@
           <a:p>
             <a:fld id="{1C2FB352-3FF1-4E47-B432-380F887EB6CA}" type="datetimeFigureOut">
               <a:rPr lang="en-US" smtClean="0"/>
-              <a:t>11/8/12</a:t>
+              <a:t>11/9/2012</a:t>
             </a:fld>
             <a:endParaRPr lang="en-US"/>
           </a:p>
@@ -1026,7 +1026,7 @@
           <a:p>
             <a:fld id="{1C2FB352-3FF1-4E47-B432-380F887EB6CA}" type="datetimeFigureOut">
               <a:rPr lang="en-US" smtClean="0"/>
-              <a:t>11/8/12</a:t>
+              <a:t>11/9/2012</a:t>
             </a:fld>
             <a:endParaRPr lang="en-US"/>
           </a:p>
@@ -1206,7 +1206,7 @@
           <a:p>
             <a:fld id="{1C2FB352-3FF1-4E47-B432-380F887EB6CA}" type="datetimeFigureOut">
               <a:rPr lang="en-US" smtClean="0"/>
-              <a:t>11/8/12</a:t>
+              <a:t>11/9/2012</a:t>
             </a:fld>
             <a:endParaRPr lang="en-US"/>
           </a:p>
@@ -1490,7 +1490,7 @@
           <a:p>
             <a:fld id="{1C2FB352-3FF1-4E47-B432-380F887EB6CA}" type="datetimeFigureOut">
               <a:rPr lang="en-US" smtClean="0"/>
-              <a:t>11/8/12</a:t>
+              <a:t>11/9/2012</a:t>
             </a:fld>
             <a:endParaRPr lang="en-US"/>
           </a:p>
@@ -1778,7 +1778,7 @@
           <a:p>
             <a:fld id="{1C2FB352-3FF1-4E47-B432-380F887EB6CA}" type="datetimeFigureOut">
               <a:rPr lang="en-US" smtClean="0"/>
-              <a:t>11/8/12</a:t>
+              <a:t>11/9/2012</a:t>
             </a:fld>
             <a:endParaRPr lang="en-US"/>
           </a:p>
@@ -2200,7 +2200,7 @@
           <a:p>
             <a:fld id="{1C2FB352-3FF1-4E47-B432-380F887EB6CA}" type="datetimeFigureOut">
               <a:rPr lang="en-US" smtClean="0"/>
-              <a:t>11/8/12</a:t>
+              <a:t>11/9/2012</a:t>
             </a:fld>
             <a:endParaRPr lang="en-US"/>
           </a:p>
@@ -2318,7 +2318,7 @@
           <a:p>
             <a:fld id="{1C2FB352-3FF1-4E47-B432-380F887EB6CA}" type="datetimeFigureOut">
               <a:rPr lang="en-US" smtClean="0"/>
-              <a:t>11/8/12</a:t>
+              <a:t>11/9/2012</a:t>
             </a:fld>
             <a:endParaRPr lang="en-US"/>
           </a:p>
@@ -2413,7 +2413,7 @@
           <a:p>
             <a:fld id="{1C2FB352-3FF1-4E47-B432-380F887EB6CA}" type="datetimeFigureOut">
               <a:rPr lang="en-US" smtClean="0"/>
-              <a:t>11/8/12</a:t>
+              <a:t>11/9/2012</a:t>
             </a:fld>
             <a:endParaRPr lang="en-US"/>
           </a:p>
@@ -2690,7 +2690,7 @@
           <a:p>
             <a:fld id="{1C2FB352-3FF1-4E47-B432-380F887EB6CA}" type="datetimeFigureOut">
               <a:rPr lang="en-US" smtClean="0"/>
-              <a:t>11/8/12</a:t>
+              <a:t>11/9/2012</a:t>
             </a:fld>
             <a:endParaRPr lang="en-US"/>
           </a:p>
@@ -2943,7 +2943,7 @@
           <a:p>
             <a:fld id="{1C2FB352-3FF1-4E47-B432-380F887EB6CA}" type="datetimeFigureOut">
               <a:rPr lang="en-US" smtClean="0"/>
-              <a:t>11/8/12</a:t>
+              <a:t>11/9/2012</a:t>
             </a:fld>
             <a:endParaRPr lang="en-US"/>
           </a:p>
@@ -3156,7 +3156,7 @@
           <a:p>
             <a:fld id="{1C2FB352-3FF1-4E47-B432-380F887EB6CA}" type="datetimeFigureOut">
               <a:rPr lang="en-US" smtClean="0"/>
-              <a:t>11/8/12</a:t>
+              <a:t>11/9/2012</a:t>
             </a:fld>
             <a:endParaRPr lang="en-US"/>
           </a:p>
@@ -3741,7 +3741,6 @@
               <a:rPr lang="en-US" dirty="0"/>
               <a:t>Website Interface</a:t>
             </a:r>
-            <a:endParaRPr lang="en-US" dirty="0"/>
           </a:p>
         </p:txBody>
       </p:sp>
@@ -3809,11 +3808,7 @@
             <a:pPr lvl="1"/>
             <a:r>
               <a:rPr lang="en-US" dirty="0" smtClean="0"/>
-              <a:t>Trending tags italicized</a:t>
-            </a:r>
-            <a:r>
-              <a:rPr lang="en-US" dirty="0" smtClean="0"/>
-              <a:t>, vertical bar, permanent tags bolded</a:t>
+              <a:t>Trending tags italicized, vertical bar, permanent tags bolded</a:t>
             </a:r>
           </a:p>
           <a:p>
@@ -3894,7 +3889,6 @@
               <a:rPr lang="en-US" dirty="0"/>
               <a:t>Website Interface</a:t>
             </a:r>
-            <a:endParaRPr lang="en-US" dirty="0"/>
           </a:p>
         </p:txBody>
       </p:sp>
@@ -4004,7 +3998,6 @@
               <a:rPr lang="en-US" dirty="0" smtClean="0"/>
               <a:t>Required by various modules</a:t>
             </a:r>
-            <a:endParaRPr lang="en-US" dirty="0" smtClean="0"/>
           </a:p>
           <a:p>
             <a:endParaRPr lang="en-US" dirty="0" smtClean="0"/>
@@ -4060,7 +4053,6 @@
               <a:rPr lang="en-US" dirty="0"/>
               <a:t>Website Interface</a:t>
             </a:r>
-            <a:endParaRPr lang="en-US" dirty="0"/>
           </a:p>
         </p:txBody>
       </p:sp>
@@ -4138,7 +4130,6 @@
               <a:rPr lang="en-US" dirty="0"/>
               <a:t>Website Interface</a:t>
             </a:r>
-            <a:endParaRPr lang="en-US" dirty="0"/>
           </a:p>
         </p:txBody>
       </p:sp>
@@ -4216,7 +4207,6 @@
               <a:rPr lang="en-US" dirty="0"/>
               <a:t>Website Interface</a:t>
             </a:r>
-            <a:endParaRPr lang="en-US" dirty="0"/>
           </a:p>
         </p:txBody>
       </p:sp>
@@ -4296,7 +4286,6 @@
               <a:rPr lang="en-US" dirty="0"/>
               <a:t>Database Redesign &amp; Shared Library</a:t>
             </a:r>
-            <a:endParaRPr lang="en-US" dirty="0"/>
           </a:p>
         </p:txBody>
       </p:sp>
@@ -4346,11 +4335,7 @@
             <a:pPr lvl="1"/>
             <a:r>
               <a:rPr lang="en-US" dirty="0" smtClean="0"/>
-              <a:t>Make logical separation between algorithms and </a:t>
-            </a:r>
-            <a:r>
-              <a:rPr lang="en-US" dirty="0" smtClean="0"/>
-              <a:t>MySQL database interaction</a:t>
+              <a:t>Make logical separation between algorithms and MySQL database interaction</a:t>
             </a:r>
           </a:p>
           <a:p>
@@ -4363,7 +4348,6 @@
               <a:rPr lang="en-US" dirty="0" smtClean="0"/>
               <a:t>MySQL</a:t>
             </a:r>
-            <a:endParaRPr lang="en-US" dirty="0" smtClean="0"/>
           </a:p>
         </p:txBody>
       </p:sp>
@@ -4418,7 +4402,6 @@
               <a:rPr lang="en-US" dirty="0"/>
               <a:t>Database Redesign &amp; Shared Library</a:t>
             </a:r>
-            <a:endParaRPr lang="en-US" dirty="0"/>
           </a:p>
         </p:txBody>
       </p:sp>
@@ -4498,7 +4481,6 @@
               <a:rPr lang="en-US" dirty="0"/>
               <a:t>RSS &amp; Web Scraping</a:t>
             </a:r>
-            <a:endParaRPr lang="en-US" dirty="0"/>
           </a:p>
         </p:txBody>
       </p:sp>
@@ -4557,12 +4539,12 @@
               <a:t>Get </a:t>
             </a:r>
             <a:r>
-              <a:rPr lang="en-US" dirty="0" err="1" smtClean="0"/>
-              <a:t>DataMean</a:t>
-            </a:r>
-            <a:r>
-              <a:rPr lang="en-US" dirty="0" smtClean="0"/>
-              <a:t> object to Process</a:t>
+              <a:rPr lang="en-US" smtClean="0"/>
+              <a:t>DataMeans </a:t>
+            </a:r>
+            <a:r>
+              <a:rPr lang="en-US" dirty="0" smtClean="0"/>
+              <a:t>object to Process</a:t>
             </a:r>
           </a:p>
           <a:p>
@@ -4592,7 +4574,6 @@
               <a:rPr lang="en-US" dirty="0" smtClean="0"/>
               <a:t>Insert data into MySQL as DataStored</a:t>
             </a:r>
-            <a:endParaRPr lang="en-US" dirty="0" smtClean="0"/>
           </a:p>
           <a:p>
             <a:endParaRPr lang="en-US" dirty="0" smtClean="0"/>
@@ -4650,7 +4631,6 @@
               <a:rPr lang="en-US" dirty="0"/>
               <a:t>RSS &amp; Web Scraping</a:t>
             </a:r>
-            <a:endParaRPr lang="en-US" dirty="0"/>
           </a:p>
         </p:txBody>
       </p:sp>
@@ -4703,7 +4683,6 @@
               <a:rPr lang="en-US" dirty="0" smtClean="0"/>
               <a:t>Combined many RSS parsing objects into single feed parser</a:t>
             </a:r>
-            <a:endParaRPr lang="en-US" dirty="0" smtClean="0"/>
           </a:p>
         </p:txBody>
       </p:sp>
@@ -4779,13 +4758,8 @@
           <a:p>
             <a:r>
               <a:rPr lang="en-US" dirty="0" smtClean="0"/>
-              <a:t>Project </a:t>
-            </a:r>
-            <a:r>
-              <a:rPr lang="en-US" dirty="0" smtClean="0"/>
-              <a:t>Description &amp; Scope</a:t>
-            </a:r>
-            <a:endParaRPr lang="en-US" dirty="0" smtClean="0"/>
+              <a:t>Project Description &amp; Scope</a:t>
+            </a:r>
           </a:p>
           <a:p>
             <a:r>
@@ -4840,7 +4814,6 @@
               <a:rPr lang="en-US" dirty="0" smtClean="0"/>
               <a:t>Drupal Modules</a:t>
             </a:r>
-            <a:endParaRPr lang="en-US" dirty="0" smtClean="0"/>
           </a:p>
           <a:p>
             <a:r>
@@ -4910,7 +4883,6 @@
               <a:rPr lang="en-US" dirty="0"/>
               <a:t>Data Fusion Algorithm</a:t>
             </a:r>
-            <a:endParaRPr lang="en-US" dirty="0"/>
           </a:p>
         </p:txBody>
       </p:sp>
@@ -5037,7 +5009,6 @@
               <a:rPr lang="en-US" dirty="0"/>
               <a:t>Data Fusion Algorithm</a:t>
             </a:r>
-            <a:endParaRPr lang="en-US" dirty="0"/>
           </a:p>
         </p:txBody>
       </p:sp>
@@ -5173,7 +5144,6 @@
               <a:rPr lang="en-US" dirty="0"/>
               <a:t>Drupal Modules</a:t>
             </a:r>
-            <a:endParaRPr lang="en-US" dirty="0"/>
           </a:p>
         </p:txBody>
       </p:sp>
@@ -5205,7 +5175,6 @@
               <a:rPr lang="en-US" dirty="0" smtClean="0"/>
               <a:t>Appear on any given article</a:t>
             </a:r>
-            <a:endParaRPr lang="en-US" dirty="0" smtClean="0"/>
           </a:p>
           <a:p>
             <a:r>
@@ -5219,7 +5188,6 @@
               <a:rPr lang="en-US" dirty="0" smtClean="0"/>
               <a:t>Add a source like The New York Times</a:t>
             </a:r>
-            <a:endParaRPr lang="en-US" dirty="0" smtClean="0"/>
           </a:p>
           <a:p>
             <a:r>
@@ -5246,7 +5214,6 @@
               <a:rPr lang="en-US" dirty="0" smtClean="0"/>
               <a:t>Approve a New York Times article to be listed as a similar article for the current article shown</a:t>
             </a:r>
-            <a:endParaRPr lang="en-US" dirty="0" smtClean="0"/>
           </a:p>
           <a:p>
             <a:endParaRPr lang="en-US" dirty="0" smtClean="0"/>
@@ -5304,7 +5271,6 @@
               <a:rPr lang="en-US" dirty="0"/>
               <a:t>Drupal Modules</a:t>
             </a:r>
-            <a:endParaRPr lang="en-US" dirty="0"/>
           </a:p>
         </p:txBody>
       </p:sp>
@@ -5384,7 +5350,6 @@
               <a:rPr lang="en-US" dirty="0"/>
               <a:t>Drupal Modules</a:t>
             </a:r>
-            <a:endParaRPr lang="en-US" dirty="0"/>
           </a:p>
         </p:txBody>
       </p:sp>
@@ -5464,7 +5429,6 @@
               <a:rPr lang="en-US" dirty="0"/>
               <a:t>Drupal Modules</a:t>
             </a:r>
-            <a:endParaRPr lang="en-US" dirty="0"/>
           </a:p>
         </p:txBody>
       </p:sp>
@@ -5544,7 +5508,6 @@
               <a:rPr lang="en-US" dirty="0"/>
               <a:t>Drupal Modules</a:t>
             </a:r>
-            <a:endParaRPr lang="en-US" dirty="0"/>
           </a:p>
         </p:txBody>
       </p:sp>
@@ -5624,7 +5587,6 @@
               <a:rPr lang="en-US" dirty="0"/>
               <a:t>Drupal Modules</a:t>
             </a:r>
-            <a:endParaRPr lang="en-US" dirty="0"/>
           </a:p>
         </p:txBody>
       </p:sp>
@@ -5704,7 +5666,6 @@
               <a:rPr lang="en-US" dirty="0"/>
               <a:t>Drupal Modules</a:t>
             </a:r>
-            <a:endParaRPr lang="en-US" dirty="0"/>
           </a:p>
         </p:txBody>
       </p:sp>
@@ -5784,7 +5745,6 @@
               <a:rPr lang="en-US" dirty="0"/>
               <a:t>Drupal Modules</a:t>
             </a:r>
-            <a:endParaRPr lang="en-US" dirty="0"/>
           </a:p>
         </p:txBody>
       </p:sp>
@@ -5957,7 +5917,6 @@
               <a:rPr lang="en-US" dirty="0"/>
               <a:t>Drupal Modules</a:t>
             </a:r>
-            <a:endParaRPr lang="en-US" dirty="0"/>
           </a:p>
         </p:txBody>
       </p:sp>

</xml_diff>

<commit_message>
Update to RSS portion of ppt presentation
</commit_message>
<xml_diff>
--- a/se_process/milestone3/milestone3.pptx
+++ b/se_process/milestone3/milestone3.pptx
@@ -493,6 +493,90 @@
     </a:lvl9pPr>
   </p:notesStyle>
 </p:notesMaster>
+</file>
+
+<file path=ppt/notesSlides/notesSlide1.xml><?xml version="1.0" encoding="utf-8"?>
+<p:notes xmlns:a="http://schemas.openxmlformats.org/drawingml/2006/main" xmlns:r="http://schemas.openxmlformats.org/officeDocument/2006/relationships" xmlns:p="http://schemas.openxmlformats.org/presentationml/2006/main">
+  <p:cSld>
+    <p:spTree>
+      <p:nvGrpSpPr>
+        <p:cNvPr id="1" name=""/>
+        <p:cNvGrpSpPr/>
+        <p:nvPr/>
+      </p:nvGrpSpPr>
+      <p:grpSpPr>
+        <a:xfrm>
+          <a:off x="0" y="0"/>
+          <a:ext cx="0" cy="0"/>
+          <a:chOff x="0" y="0"/>
+          <a:chExt cx="0" cy="0"/>
+        </a:xfrm>
+      </p:grpSpPr>
+      <p:sp>
+        <p:nvSpPr>
+          <p:cNvPr id="2" name="Slide Image Placeholder 1"/>
+          <p:cNvSpPr>
+            <a:spLocks noGrp="1" noRot="1" noChangeAspect="1"/>
+          </p:cNvSpPr>
+          <p:nvPr>
+            <p:ph type="sldImg"/>
+          </p:nvPr>
+        </p:nvSpPr>
+        <p:spPr/>
+      </p:sp>
+      <p:sp>
+        <p:nvSpPr>
+          <p:cNvPr id="3" name="Notes Placeholder 2"/>
+          <p:cNvSpPr>
+            <a:spLocks noGrp="1"/>
+          </p:cNvSpPr>
+          <p:nvPr>
+            <p:ph type="body" idx="1"/>
+          </p:nvPr>
+        </p:nvSpPr>
+        <p:spPr/>
+        <p:txBody>
+          <a:bodyPr/>
+          <a:lstStyle/>
+          <a:p>
+            <a:endParaRPr lang="en-US" dirty="0"/>
+          </a:p>
+        </p:txBody>
+      </p:sp>
+      <p:sp>
+        <p:nvSpPr>
+          <p:cNvPr id="4" name="Slide Number Placeholder 3"/>
+          <p:cNvSpPr>
+            <a:spLocks noGrp="1"/>
+          </p:cNvSpPr>
+          <p:nvPr>
+            <p:ph type="sldNum" sz="quarter" idx="10"/>
+          </p:nvPr>
+        </p:nvSpPr>
+        <p:spPr/>
+        <p:txBody>
+          <a:bodyPr/>
+          <a:lstStyle/>
+          <a:p>
+            <a:fld id="{23135881-2416-0642-BBD6-3E35F7F3D7A4}" type="slidenum">
+              <a:rPr lang="en-US" smtClean="0"/>
+              <a:t>19</a:t>
+            </a:fld>
+            <a:endParaRPr lang="en-US"/>
+          </a:p>
+        </p:txBody>
+      </p:sp>
+    </p:spTree>
+    <p:extLst>
+      <p:ext uri="{BB962C8B-B14F-4D97-AF65-F5344CB8AC3E}">
+        <p14:creationId xmlns:p14="http://schemas.microsoft.com/office/powerpoint/2010/main" val="3193062807"/>
+      </p:ext>
+    </p:extLst>
+  </p:cSld>
+  <p:clrMapOvr>
+    <a:masterClrMapping/>
+  </p:clrMapOvr>
+</p:notes>
 </file>
 
 <file path=ppt/slideLayouts/slideLayout1.xml><?xml version="1.0" encoding="utf-8"?>
@@ -4497,7 +4581,7 @@
         <p:spPr/>
         <p:txBody>
           <a:bodyPr>
-            <a:normAutofit lnSpcReduction="10000"/>
+            <a:normAutofit/>
           </a:bodyPr>
           <a:lstStyle/>
           <a:p>
@@ -4510,8 +4594,17 @@
             <a:pPr lvl="1"/>
             <a:r>
               <a:rPr lang="en-US" dirty="0" smtClean="0"/>
-              <a:t>Download RSS feeds and HTML pages</a:t>
-            </a:r>
+              <a:t>Parse </a:t>
+            </a:r>
+            <a:r>
+              <a:rPr lang="en-US" dirty="0" smtClean="0"/>
+              <a:t>RSS </a:t>
+            </a:r>
+            <a:r>
+              <a:rPr lang="en-US" dirty="0" smtClean="0"/>
+              <a:t>feeds for individual posts</a:t>
+            </a:r>
+            <a:endParaRPr lang="en-US" dirty="0" smtClean="0"/>
           </a:p>
           <a:p>
             <a:r>
@@ -4523,8 +4616,13 @@
             <a:pPr lvl="1"/>
             <a:r>
               <a:rPr lang="en-US" dirty="0" smtClean="0"/>
-              <a:t>XML Parsing of documents in RSS feeds</a:t>
-            </a:r>
+              <a:t>XML Parsing </a:t>
+            </a:r>
+            <a:r>
+              <a:rPr lang="en-US" dirty="0" smtClean="0"/>
+              <a:t>for ROME</a:t>
+            </a:r>
+            <a:endParaRPr lang="en-US" dirty="0" smtClean="0"/>
           </a:p>
           <a:p>
             <a:r>
@@ -4539,12 +4637,12 @@
               <a:t>Get </a:t>
             </a:r>
             <a:r>
-              <a:rPr lang="en-US" smtClean="0"/>
-              <a:t>DataMeans </a:t>
-            </a:r>
-            <a:r>
-              <a:rPr lang="en-US" dirty="0" smtClean="0"/>
-              <a:t>object to Process</a:t>
+              <a:rPr lang="en-US" dirty="0" err="1" smtClean="0"/>
+              <a:t>DataMeans</a:t>
+            </a:r>
+            <a:r>
+              <a:rPr lang="en-US" dirty="0" smtClean="0"/>
+              <a:t> object to Process</a:t>
             </a:r>
           </a:p>
           <a:p>
@@ -4558,21 +4656,23 @@
             <a:pPr lvl="1"/>
             <a:r>
               <a:rPr lang="en-US" dirty="0" smtClean="0"/>
-              <a:t>Use ROME to get RSS feed</a:t>
-            </a:r>
+              <a:t>Use ROME to </a:t>
+            </a:r>
+            <a:r>
+              <a:rPr lang="en-US" dirty="0" smtClean="0"/>
+              <a:t>get new RSS posts from feed</a:t>
+            </a:r>
+            <a:endParaRPr lang="en-US" dirty="0" smtClean="0"/>
           </a:p>
           <a:p>
             <a:pPr lvl="1"/>
             <a:r>
               <a:rPr lang="en-US" dirty="0" smtClean="0"/>
-              <a:t>Use JDOM to parse XML</a:t>
-            </a:r>
-          </a:p>
-          <a:p>
-            <a:pPr lvl="1"/>
-            <a:r>
-              <a:rPr lang="en-US" dirty="0" smtClean="0"/>
-              <a:t>Insert data into MySQL as DataStored</a:t>
+              <a:t>Insert </a:t>
+            </a:r>
+            <a:r>
+              <a:rPr lang="en-US" dirty="0" smtClean="0"/>
+              <a:t>data into MySQL as DataStored</a:t>
             </a:r>
           </a:p>
           <a:p>
@@ -4674,7 +4774,23 @@
             <a:pPr lvl="1"/>
             <a:r>
               <a:rPr lang="en-US" dirty="0" smtClean="0"/>
-              <a:t>DateTime field in DataMeans to determine if RSS posts should be aggregated</a:t>
+              <a:t>DateTime field in DataMeans to determine </a:t>
+            </a:r>
+            <a:r>
+              <a:rPr lang="en-US" dirty="0" smtClean="0"/>
+              <a:t>if an </a:t>
+            </a:r>
+            <a:r>
+              <a:rPr lang="en-US" dirty="0" smtClean="0"/>
+              <a:t>RSS </a:t>
+            </a:r>
+            <a:r>
+              <a:rPr lang="en-US" dirty="0" smtClean="0"/>
+              <a:t>post </a:t>
+            </a:r>
+            <a:r>
+              <a:rPr lang="en-US" dirty="0" smtClean="0"/>
+              <a:t>should be aggregated</a:t>
             </a:r>
           </a:p>
           <a:p>

</xml_diff>